<commit_message>
modified System design doc
</commit_message>
<xml_diff>
--- a/doc/phase2/System design.pptx
+++ b/doc/phase2/System design.pptx
@@ -5,32 +5,33 @@
     <p:sldMasterId id="2147483648" r:id="rId1"/>
   </p:sldMasterIdLst>
   <p:notesMasterIdLst>
-    <p:notesMasterId r:id="rId25"/>
+    <p:notesMasterId r:id="rId26"/>
   </p:notesMasterIdLst>
   <p:sldIdLst>
     <p:sldId id="256" r:id="rId2"/>
-    <p:sldId id="273" r:id="rId3"/>
-    <p:sldId id="274" r:id="rId4"/>
-    <p:sldId id="257" r:id="rId5"/>
-    <p:sldId id="258" r:id="rId6"/>
-    <p:sldId id="260" r:id="rId7"/>
-    <p:sldId id="270" r:id="rId8"/>
-    <p:sldId id="261" r:id="rId9"/>
-    <p:sldId id="262" r:id="rId10"/>
-    <p:sldId id="263" r:id="rId11"/>
-    <p:sldId id="264" r:id="rId12"/>
-    <p:sldId id="265" r:id="rId13"/>
-    <p:sldId id="271" r:id="rId14"/>
-    <p:sldId id="266" r:id="rId15"/>
-    <p:sldId id="267" r:id="rId16"/>
-    <p:sldId id="268" r:id="rId17"/>
-    <p:sldId id="269" r:id="rId18"/>
-    <p:sldId id="272" r:id="rId19"/>
-    <p:sldId id="275" r:id="rId20"/>
-    <p:sldId id="276" r:id="rId21"/>
-    <p:sldId id="277" r:id="rId22"/>
-    <p:sldId id="278" r:id="rId23"/>
-    <p:sldId id="279" r:id="rId24"/>
+    <p:sldId id="280" r:id="rId3"/>
+    <p:sldId id="273" r:id="rId4"/>
+    <p:sldId id="274" r:id="rId5"/>
+    <p:sldId id="257" r:id="rId6"/>
+    <p:sldId id="258" r:id="rId7"/>
+    <p:sldId id="260" r:id="rId8"/>
+    <p:sldId id="270" r:id="rId9"/>
+    <p:sldId id="261" r:id="rId10"/>
+    <p:sldId id="262" r:id="rId11"/>
+    <p:sldId id="263" r:id="rId12"/>
+    <p:sldId id="264" r:id="rId13"/>
+    <p:sldId id="265" r:id="rId14"/>
+    <p:sldId id="271" r:id="rId15"/>
+    <p:sldId id="266" r:id="rId16"/>
+    <p:sldId id="267" r:id="rId17"/>
+    <p:sldId id="268" r:id="rId18"/>
+    <p:sldId id="269" r:id="rId19"/>
+    <p:sldId id="272" r:id="rId20"/>
+    <p:sldId id="275" r:id="rId21"/>
+    <p:sldId id="276" r:id="rId22"/>
+    <p:sldId id="277" r:id="rId23"/>
+    <p:sldId id="278" r:id="rId24"/>
+    <p:sldId id="279" r:id="rId25"/>
   </p:sldIdLst>
   <p:sldSz cx="12192000" cy="6858000"/>
   <p:notesSz cx="6858000" cy="9144000"/>
@@ -219,7 +220,7 @@
           <a:p>
             <a:fld id="{D136E019-0B08-CA45-93C7-CE9766CE945A}" type="datetimeFigureOut">
               <a:rPr lang="en-US" smtClean="0"/>
-              <a:t>6/18/17</a:t>
+              <a:t>6/19/17</a:t>
             </a:fld>
             <a:endParaRPr lang="en-US"/>
           </a:p>
@@ -618,7 +619,7 @@
           <a:p>
             <a:fld id="{3C60DAC5-45BC-9149-9C55-CD167D36A919}" type="datetimeFigureOut">
               <a:rPr lang="en-US" smtClean="0"/>
-              <a:t>6/18/17</a:t>
+              <a:t>6/19/17</a:t>
             </a:fld>
             <a:endParaRPr lang="en-US"/>
           </a:p>
@@ -788,7 +789,7 @@
           <a:p>
             <a:fld id="{3C60DAC5-45BC-9149-9C55-CD167D36A919}" type="datetimeFigureOut">
               <a:rPr lang="en-US" smtClean="0"/>
-              <a:t>6/18/17</a:t>
+              <a:t>6/19/17</a:t>
             </a:fld>
             <a:endParaRPr lang="en-US"/>
           </a:p>
@@ -968,7 +969,7 @@
           <a:p>
             <a:fld id="{3C60DAC5-45BC-9149-9C55-CD167D36A919}" type="datetimeFigureOut">
               <a:rPr lang="en-US" smtClean="0"/>
-              <a:t>6/18/17</a:t>
+              <a:t>6/19/17</a:t>
             </a:fld>
             <a:endParaRPr lang="en-US"/>
           </a:p>
@@ -1138,7 +1139,7 @@
           <a:p>
             <a:fld id="{3C60DAC5-45BC-9149-9C55-CD167D36A919}" type="datetimeFigureOut">
               <a:rPr lang="en-US" smtClean="0"/>
-              <a:t>6/18/17</a:t>
+              <a:t>6/19/17</a:t>
             </a:fld>
             <a:endParaRPr lang="en-US"/>
           </a:p>
@@ -1384,7 +1385,7 @@
           <a:p>
             <a:fld id="{3C60DAC5-45BC-9149-9C55-CD167D36A919}" type="datetimeFigureOut">
               <a:rPr lang="en-US" smtClean="0"/>
-              <a:t>6/18/17</a:t>
+              <a:t>6/19/17</a:t>
             </a:fld>
             <a:endParaRPr lang="en-US"/>
           </a:p>
@@ -1616,7 +1617,7 @@
           <a:p>
             <a:fld id="{3C60DAC5-45BC-9149-9C55-CD167D36A919}" type="datetimeFigureOut">
               <a:rPr lang="en-US" smtClean="0"/>
-              <a:t>6/18/17</a:t>
+              <a:t>6/19/17</a:t>
             </a:fld>
             <a:endParaRPr lang="en-US"/>
           </a:p>
@@ -1983,7 +1984,7 @@
           <a:p>
             <a:fld id="{3C60DAC5-45BC-9149-9C55-CD167D36A919}" type="datetimeFigureOut">
               <a:rPr lang="en-US" smtClean="0"/>
-              <a:t>6/18/17</a:t>
+              <a:t>6/19/17</a:t>
             </a:fld>
             <a:endParaRPr lang="en-US"/>
           </a:p>
@@ -2101,7 +2102,7 @@
           <a:p>
             <a:fld id="{3C60DAC5-45BC-9149-9C55-CD167D36A919}" type="datetimeFigureOut">
               <a:rPr lang="en-US" smtClean="0"/>
-              <a:t>6/18/17</a:t>
+              <a:t>6/19/17</a:t>
             </a:fld>
             <a:endParaRPr lang="en-US"/>
           </a:p>
@@ -2196,7 +2197,7 @@
           <a:p>
             <a:fld id="{3C60DAC5-45BC-9149-9C55-CD167D36A919}" type="datetimeFigureOut">
               <a:rPr lang="en-US" smtClean="0"/>
-              <a:t>6/18/17</a:t>
+              <a:t>6/19/17</a:t>
             </a:fld>
             <a:endParaRPr lang="en-US"/>
           </a:p>
@@ -2473,7 +2474,7 @@
           <a:p>
             <a:fld id="{3C60DAC5-45BC-9149-9C55-CD167D36A919}" type="datetimeFigureOut">
               <a:rPr lang="en-US" smtClean="0"/>
-              <a:t>6/18/17</a:t>
+              <a:t>6/19/17</a:t>
             </a:fld>
             <a:endParaRPr lang="en-US"/>
           </a:p>
@@ -2726,7 +2727,7 @@
           <a:p>
             <a:fld id="{3C60DAC5-45BC-9149-9C55-CD167D36A919}" type="datetimeFigureOut">
               <a:rPr lang="en-US" smtClean="0"/>
-              <a:t>6/18/17</a:t>
+              <a:t>6/19/17</a:t>
             </a:fld>
             <a:endParaRPr lang="en-US"/>
           </a:p>
@@ -2969,7 +2970,7 @@
           <a:p>
             <a:fld id="{3C60DAC5-45BC-9149-9C55-CD167D36A919}" type="datetimeFigureOut">
               <a:rPr lang="en-US" smtClean="0"/>
-              <a:t>6/18/17</a:t>
+              <a:t>6/19/17</a:t>
             </a:fld>
             <a:endParaRPr lang="en-US"/>
           </a:p>
@@ -3391,7 +3392,11 @@
           <a:p>
             <a:r>
               <a:rPr lang="en-US" dirty="0" smtClean="0"/>
-              <a:t>Design Document</a:t>
+              <a:t>System Design </a:t>
+            </a:r>
+            <a:r>
+              <a:rPr lang="en-US" dirty="0" smtClean="0"/>
+              <a:t>Document</a:t>
             </a:r>
             <a:endParaRPr lang="en-US" dirty="0"/>
           </a:p>
@@ -3412,7 +3417,17 @@
           <a:bodyPr/>
           <a:lstStyle/>
           <a:p>
-            <a:endParaRPr lang="en-US"/>
+            <a:r>
+              <a:rPr lang="en-US" dirty="0" smtClean="0"/>
+              <a:t>The used book transaction platform</a:t>
+            </a:r>
+          </a:p>
+          <a:p>
+            <a:r>
+              <a:rPr lang="en-US" dirty="0" smtClean="0"/>
+              <a:t>-- Team Name</a:t>
+            </a:r>
+            <a:endParaRPr lang="en-US" dirty="0"/>
           </a:p>
         </p:txBody>
       </p:sp>
@@ -3490,7 +3505,7 @@
             </a:r>
             <a:r>
               <a:rPr lang="en-US" dirty="0" err="1" smtClean="0"/>
-              <a:t>PostDAO</a:t>
+              <a:t>UserDAO</a:t>
             </a:r>
             <a:r>
               <a:rPr lang="en-US" dirty="0" smtClean="0"/>
@@ -3507,7 +3522,7 @@
             <a:pPr lvl="1"/>
             <a:r>
               <a:rPr lang="en-US" dirty="0" smtClean="0"/>
-              <a:t>-- Provide the abstraction of operations on the posts’ info in the database</a:t>
+              <a:t>-- Provide the abstraction of operations on the user accounts’ info in the database</a:t>
             </a:r>
           </a:p>
           <a:p>
@@ -3521,7 +3536,7 @@
     </p:spTree>
     <p:extLst>
       <p:ext uri="{BB962C8B-B14F-4D97-AF65-F5344CB8AC3E}">
-        <p14:creationId xmlns:p14="http://schemas.microsoft.com/office/powerpoint/2010/main" val="1539448091"/>
+        <p14:creationId xmlns:p14="http://schemas.microsoft.com/office/powerpoint/2010/main" val="116378977"/>
       </p:ext>
     </p:extLst>
   </p:cSld>
@@ -3592,7 +3607,7 @@
             </a:r>
             <a:r>
               <a:rPr lang="en-US" dirty="0" err="1" smtClean="0"/>
-              <a:t>MailDAO</a:t>
+              <a:t>PostDAO</a:t>
             </a:r>
             <a:r>
               <a:rPr lang="en-US" dirty="0" smtClean="0"/>
@@ -3609,7 +3624,7 @@
             <a:pPr lvl="1"/>
             <a:r>
               <a:rPr lang="en-US" dirty="0" smtClean="0"/>
-              <a:t>-- Provide the abstraction of operations on the emails’ info in the database</a:t>
+              <a:t>-- Provide the abstraction of operations on the posts’ info in the database</a:t>
             </a:r>
           </a:p>
           <a:p>
@@ -3623,7 +3638,7 @@
     </p:spTree>
     <p:extLst>
       <p:ext uri="{BB962C8B-B14F-4D97-AF65-F5344CB8AC3E}">
-        <p14:creationId xmlns:p14="http://schemas.microsoft.com/office/powerpoint/2010/main" val="560125372"/>
+        <p14:creationId xmlns:p14="http://schemas.microsoft.com/office/powerpoint/2010/main" val="1539448091"/>
       </p:ext>
     </p:extLst>
   </p:cSld>
@@ -3694,7 +3709,7 @@
             </a:r>
             <a:r>
               <a:rPr lang="en-US" dirty="0" err="1" smtClean="0"/>
-              <a:t>CommentDAO</a:t>
+              <a:t>MailDAO</a:t>
             </a:r>
             <a:r>
               <a:rPr lang="en-US" dirty="0" smtClean="0"/>
@@ -3711,7 +3726,7 @@
             <a:pPr lvl="1"/>
             <a:r>
               <a:rPr lang="en-US" dirty="0" smtClean="0"/>
-              <a:t>-- Provide the abstraction of operations on the comments’ info in the database</a:t>
+              <a:t>-- Provide the abstraction of operations on the emails’ info in the database</a:t>
             </a:r>
           </a:p>
           <a:p>
@@ -3725,7 +3740,7 @@
     </p:spTree>
     <p:extLst>
       <p:ext uri="{BB962C8B-B14F-4D97-AF65-F5344CB8AC3E}">
-        <p14:creationId xmlns:p14="http://schemas.microsoft.com/office/powerpoint/2010/main" val="30560730"/>
+        <p14:creationId xmlns:p14="http://schemas.microsoft.com/office/powerpoint/2010/main" val="560125372"/>
       </p:ext>
     </p:extLst>
   </p:cSld>
@@ -3796,7 +3811,7 @@
             </a:r>
             <a:r>
               <a:rPr lang="en-US" dirty="0" err="1" smtClean="0"/>
-              <a:t>ProfileDAO</a:t>
+              <a:t>CommentDAO</a:t>
             </a:r>
             <a:r>
               <a:rPr lang="en-US" dirty="0" smtClean="0"/>
@@ -3813,7 +3828,7 @@
             <a:pPr lvl="1"/>
             <a:r>
               <a:rPr lang="en-US" dirty="0" smtClean="0"/>
-              <a:t>-- Provide the abstraction of operations on the profiles’ info in the database</a:t>
+              <a:t>-- Provide the abstraction of operations on the comments’ info in the database</a:t>
             </a:r>
           </a:p>
           <a:p>
@@ -3827,7 +3842,7 @@
     </p:spTree>
     <p:extLst>
       <p:ext uri="{BB962C8B-B14F-4D97-AF65-F5344CB8AC3E}">
-        <p14:creationId xmlns:p14="http://schemas.microsoft.com/office/powerpoint/2010/main" val="1811355077"/>
+        <p14:creationId xmlns:p14="http://schemas.microsoft.com/office/powerpoint/2010/main" val="30560730"/>
       </p:ext>
     </p:extLst>
   </p:cSld>
@@ -3898,9 +3913,12 @@
             </a:r>
             <a:r>
               <a:rPr lang="en-US" dirty="0" err="1" smtClean="0"/>
-              <a:t>UserDAOImple</a:t>
-            </a:r>
-            <a:endParaRPr lang="en-US" dirty="0"/>
+              <a:t>ProfileDAO</a:t>
+            </a:r>
+            <a:r>
+              <a:rPr lang="en-US" dirty="0" smtClean="0"/>
+              <a:t> &lt;Interface&gt;</a:t>
+            </a:r>
           </a:p>
           <a:p>
             <a:r>
@@ -3912,32 +3930,13 @@
             <a:pPr lvl="1"/>
             <a:r>
               <a:rPr lang="en-US" dirty="0" smtClean="0"/>
-              <a:t>-- store a newly created user’s information in the database</a:t>
-            </a:r>
-          </a:p>
-          <a:p>
-            <a:pPr lvl="1"/>
-            <a:r>
-              <a:rPr lang="en-US" dirty="0" smtClean="0"/>
-              <a:t>-- update/delete a user’s information in the database</a:t>
-            </a:r>
-          </a:p>
-          <a:p>
-            <a:pPr lvl="1"/>
-            <a:endParaRPr lang="en-US" dirty="0" smtClean="0"/>
-          </a:p>
-          <a:p>
-            <a:r>
-              <a:rPr lang="en-US" dirty="0" smtClean="0"/>
-              <a:t>-- Collaborators: </a:t>
-            </a:r>
-            <a:r>
-              <a:rPr lang="en-US" dirty="0" err="1" smtClean="0"/>
-              <a:t>UserDAO</a:t>
-            </a:r>
-            <a:r>
-              <a:rPr lang="en-US" dirty="0" smtClean="0"/>
-              <a:t> (implements)</a:t>
+              <a:t>-- Provide the abstraction of operations on the profiles’ info in the database</a:t>
+            </a:r>
+          </a:p>
+          <a:p>
+            <a:r>
+              <a:rPr lang="en-US" dirty="0" smtClean="0"/>
+              <a:t>-- Collaborators: None</a:t>
             </a:r>
           </a:p>
         </p:txBody>
@@ -3945,7 +3944,7 @@
     </p:spTree>
     <p:extLst>
       <p:ext uri="{BB962C8B-B14F-4D97-AF65-F5344CB8AC3E}">
-        <p14:creationId xmlns:p14="http://schemas.microsoft.com/office/powerpoint/2010/main" val="576732520"/>
+        <p14:creationId xmlns:p14="http://schemas.microsoft.com/office/powerpoint/2010/main" val="1811355077"/>
       </p:ext>
     </p:extLst>
   </p:cSld>
@@ -4016,7 +4015,7 @@
             </a:r>
             <a:r>
               <a:rPr lang="en-US" dirty="0" err="1" smtClean="0"/>
-              <a:t>PostDAOImple</a:t>
+              <a:t>UserDAOImple</a:t>
             </a:r>
             <a:endParaRPr lang="en-US" dirty="0"/>
           </a:p>
@@ -4030,14 +4029,14 @@
             <a:pPr lvl="1"/>
             <a:r>
               <a:rPr lang="en-US" dirty="0" smtClean="0"/>
-              <a:t>-- store a newly created post’s information in the database</a:t>
+              <a:t>-- store a newly created user’s information in the database</a:t>
             </a:r>
           </a:p>
           <a:p>
             <a:pPr lvl="1"/>
             <a:r>
               <a:rPr lang="en-US" dirty="0" smtClean="0"/>
-              <a:t>-- update/delete a post’s information in the database</a:t>
+              <a:t>-- update/delete a user’s information in the database</a:t>
             </a:r>
           </a:p>
           <a:p>
@@ -4051,7 +4050,7 @@
             </a:r>
             <a:r>
               <a:rPr lang="en-US" dirty="0" err="1" smtClean="0"/>
-              <a:t>PostDAO</a:t>
+              <a:t>UserDAO</a:t>
             </a:r>
             <a:r>
               <a:rPr lang="en-US" dirty="0" smtClean="0"/>
@@ -4063,7 +4062,7 @@
     </p:spTree>
     <p:extLst>
       <p:ext uri="{BB962C8B-B14F-4D97-AF65-F5344CB8AC3E}">
-        <p14:creationId xmlns:p14="http://schemas.microsoft.com/office/powerpoint/2010/main" val="1401444463"/>
+        <p14:creationId xmlns:p14="http://schemas.microsoft.com/office/powerpoint/2010/main" val="576732520"/>
       </p:ext>
     </p:extLst>
   </p:cSld>
@@ -4134,7 +4133,7 @@
             </a:r>
             <a:r>
               <a:rPr lang="en-US" dirty="0" err="1" smtClean="0"/>
-              <a:t>MailDAOImple</a:t>
+              <a:t>PostDAOImple</a:t>
             </a:r>
             <a:endParaRPr lang="en-US" dirty="0"/>
           </a:p>
@@ -4148,14 +4147,14 @@
             <a:pPr lvl="1"/>
             <a:r>
               <a:rPr lang="en-US" dirty="0" smtClean="0"/>
-              <a:t>-- store a newly created email’s information in the database</a:t>
+              <a:t>-- store a newly created post’s information in the database</a:t>
             </a:r>
           </a:p>
           <a:p>
             <a:pPr lvl="1"/>
             <a:r>
               <a:rPr lang="en-US" dirty="0" smtClean="0"/>
-              <a:t>-- update/delete a email’s information in the database</a:t>
+              <a:t>-- update/delete a post’s information in the database</a:t>
             </a:r>
           </a:p>
           <a:p>
@@ -4169,7 +4168,7 @@
             </a:r>
             <a:r>
               <a:rPr lang="en-US" dirty="0" err="1" smtClean="0"/>
-              <a:t>MailDAO</a:t>
+              <a:t>PostDAO</a:t>
             </a:r>
             <a:r>
               <a:rPr lang="en-US" dirty="0" smtClean="0"/>
@@ -4181,7 +4180,7 @@
     </p:spTree>
     <p:extLst>
       <p:ext uri="{BB962C8B-B14F-4D97-AF65-F5344CB8AC3E}">
-        <p14:creationId xmlns:p14="http://schemas.microsoft.com/office/powerpoint/2010/main" val="395202229"/>
+        <p14:creationId xmlns:p14="http://schemas.microsoft.com/office/powerpoint/2010/main" val="1401444463"/>
       </p:ext>
     </p:extLst>
   </p:cSld>
@@ -4252,7 +4251,7 @@
             </a:r>
             <a:r>
               <a:rPr lang="en-US" dirty="0" err="1" smtClean="0"/>
-              <a:t>CommentDAOImple</a:t>
+              <a:t>MailDAOImple</a:t>
             </a:r>
             <a:endParaRPr lang="en-US" dirty="0"/>
           </a:p>
@@ -4266,14 +4265,14 @@
             <a:pPr lvl="1"/>
             <a:r>
               <a:rPr lang="en-US" dirty="0" smtClean="0"/>
-              <a:t>-- store a newly created comment’s information in the database</a:t>
+              <a:t>-- store a newly created email’s information in the database</a:t>
             </a:r>
           </a:p>
           <a:p>
             <a:pPr lvl="1"/>
             <a:r>
               <a:rPr lang="en-US" dirty="0" smtClean="0"/>
-              <a:t>-- update/delete a comment’s information in the database</a:t>
+              <a:t>-- update/delete a email’s information in the database</a:t>
             </a:r>
           </a:p>
           <a:p>
@@ -4287,7 +4286,7 @@
             </a:r>
             <a:r>
               <a:rPr lang="en-US" dirty="0" err="1" smtClean="0"/>
-              <a:t>CommentDAO</a:t>
+              <a:t>MailDAO</a:t>
             </a:r>
             <a:r>
               <a:rPr lang="en-US" dirty="0" smtClean="0"/>
@@ -4299,7 +4298,7 @@
     </p:spTree>
     <p:extLst>
       <p:ext uri="{BB962C8B-B14F-4D97-AF65-F5344CB8AC3E}">
-        <p14:creationId xmlns:p14="http://schemas.microsoft.com/office/powerpoint/2010/main" val="1254968430"/>
+        <p14:creationId xmlns:p14="http://schemas.microsoft.com/office/powerpoint/2010/main" val="395202229"/>
       </p:ext>
     </p:extLst>
   </p:cSld>
@@ -4370,7 +4369,7 @@
             </a:r>
             <a:r>
               <a:rPr lang="en-US" dirty="0" err="1" smtClean="0"/>
-              <a:t>ProfileDAOImple</a:t>
+              <a:t>CommentDAOImple</a:t>
             </a:r>
             <a:endParaRPr lang="en-US" dirty="0"/>
           </a:p>
@@ -4384,14 +4383,14 @@
             <a:pPr lvl="1"/>
             <a:r>
               <a:rPr lang="en-US" dirty="0" smtClean="0"/>
-              <a:t>-- store a newly created profile’s information in the database</a:t>
+              <a:t>-- store a newly created comment’s information in the database</a:t>
             </a:r>
           </a:p>
           <a:p>
             <a:pPr lvl="1"/>
             <a:r>
               <a:rPr lang="en-US" dirty="0" smtClean="0"/>
-              <a:t>-- update/delete a profile’s information in the database</a:t>
+              <a:t>-- update/delete a comment’s information in the database</a:t>
             </a:r>
           </a:p>
           <a:p>
@@ -4417,7 +4416,7 @@
     </p:spTree>
     <p:extLst>
       <p:ext uri="{BB962C8B-B14F-4D97-AF65-F5344CB8AC3E}">
-        <p14:creationId xmlns:p14="http://schemas.microsoft.com/office/powerpoint/2010/main" val="134479411"/>
+        <p14:creationId xmlns:p14="http://schemas.microsoft.com/office/powerpoint/2010/main" val="1254968430"/>
       </p:ext>
     </p:extLst>
   </p:cSld>
@@ -4461,7 +4460,7 @@
           <a:p>
             <a:r>
               <a:rPr lang="en-US" dirty="0" smtClean="0"/>
-              <a:t>System Interaction and Environment</a:t>
+              <a:t>CRC Cards</a:t>
             </a:r>
             <a:endParaRPr lang="en-US" dirty="0"/>
           </a:p>
@@ -4484,48 +4483,50 @@
           <a:p>
             <a:r>
               <a:rPr lang="en-US" dirty="0" smtClean="0"/>
-              <a:t>The technologies will be using are:</a:t>
+              <a:t>-- Name: </a:t>
+            </a:r>
+            <a:r>
+              <a:rPr lang="en-US" dirty="0" err="1" smtClean="0"/>
+              <a:t>ProfileDAOImple</a:t>
+            </a:r>
+            <a:endParaRPr lang="en-US" dirty="0"/>
+          </a:p>
+          <a:p>
+            <a:r>
+              <a:rPr lang="en-US" dirty="0" smtClean="0"/>
+              <a:t>-- Responsibilities: </a:t>
             </a:r>
           </a:p>
           <a:p>
             <a:pPr lvl="1"/>
             <a:r>
               <a:rPr lang="en-US" dirty="0" smtClean="0"/>
-              <a:t>Server: </a:t>
+              <a:t>-- store a newly created profile’s information in the database</a:t>
+            </a:r>
+          </a:p>
+          <a:p>
+            <a:pPr lvl="1"/>
+            <a:r>
+              <a:rPr lang="en-US" dirty="0" smtClean="0"/>
+              <a:t>-- update/delete a profile’s information in the database</a:t>
+            </a:r>
+          </a:p>
+          <a:p>
+            <a:pPr lvl="1"/>
+            <a:endParaRPr lang="en-US" dirty="0" smtClean="0"/>
+          </a:p>
+          <a:p>
+            <a:r>
+              <a:rPr lang="en-US" dirty="0" smtClean="0"/>
+              <a:t>-- Collaborators: </a:t>
             </a:r>
             <a:r>
               <a:rPr lang="en-US" dirty="0" err="1" smtClean="0"/>
-              <a:t>Node.js</a:t>
-            </a:r>
-            <a:r>
-              <a:rPr lang="en-US" dirty="0" smtClean="0"/>
-              <a:t>, Express framework</a:t>
-            </a:r>
-          </a:p>
-          <a:p>
-            <a:pPr lvl="1"/>
-            <a:r>
-              <a:rPr lang="en-US" dirty="0" smtClean="0"/>
-              <a:t>Database: </a:t>
-            </a:r>
-            <a:r>
-              <a:rPr lang="en-US" dirty="0" err="1" smtClean="0"/>
-              <a:t>Nedb</a:t>
-            </a:r>
-            <a:endParaRPr lang="en-US" dirty="0" smtClean="0"/>
-          </a:p>
-          <a:p>
-            <a:pPr lvl="1"/>
-            <a:r>
-              <a:rPr lang="en-US" dirty="0" smtClean="0"/>
-              <a:t>Front-end: HTML5, CSS, plaint JavaScript</a:t>
-            </a:r>
-            <a:endParaRPr lang="en-US" dirty="0"/>
-          </a:p>
-          <a:p>
-            <a:r>
-              <a:rPr lang="en-US" dirty="0" smtClean="0"/>
-              <a:t>The users will be able to use our application through a PC on a modernly widely used browser(e.g. Safari, Chrome)</a:t>
+              <a:t>CommentDAO</a:t>
+            </a:r>
+            <a:r>
+              <a:rPr lang="en-US" dirty="0" smtClean="0"/>
+              <a:t> (implements)</a:t>
             </a:r>
           </a:p>
         </p:txBody>
@@ -4533,7 +4534,7 @@
     </p:spTree>
     <p:extLst>
       <p:ext uri="{BB962C8B-B14F-4D97-AF65-F5344CB8AC3E}">
-        <p14:creationId xmlns:p14="http://schemas.microsoft.com/office/powerpoint/2010/main" val="1922570035"/>
+        <p14:creationId xmlns:p14="http://schemas.microsoft.com/office/powerpoint/2010/main" val="134479411"/>
       </p:ext>
     </p:extLst>
   </p:cSld>
@@ -4544,6 +4545,116 @@
 </file>
 
 <file path=ppt/slides/slide2.xml><?xml version="1.0" encoding="utf-8"?>
+<p:sld xmlns:a="http://schemas.openxmlformats.org/drawingml/2006/main" xmlns:r="http://schemas.openxmlformats.org/officeDocument/2006/relationships" xmlns:p="http://schemas.openxmlformats.org/presentationml/2006/main">
+  <p:cSld>
+    <p:spTree>
+      <p:nvGrpSpPr>
+        <p:cNvPr id="1" name=""/>
+        <p:cNvGrpSpPr/>
+        <p:nvPr/>
+      </p:nvGrpSpPr>
+      <p:grpSpPr>
+        <a:xfrm>
+          <a:off x="0" y="0"/>
+          <a:ext cx="0" cy="0"/>
+          <a:chOff x="0" y="0"/>
+          <a:chExt cx="0" cy="0"/>
+        </a:xfrm>
+      </p:grpSpPr>
+      <p:sp>
+        <p:nvSpPr>
+          <p:cNvPr id="2" name="Title 1"/>
+          <p:cNvSpPr>
+            <a:spLocks noGrp="1"/>
+          </p:cNvSpPr>
+          <p:nvPr>
+            <p:ph type="title"/>
+          </p:nvPr>
+        </p:nvSpPr>
+        <p:spPr/>
+        <p:txBody>
+          <a:bodyPr/>
+          <a:lstStyle/>
+          <a:p>
+            <a:r>
+              <a:rPr lang="en-US" dirty="0" smtClean="0"/>
+              <a:t>Contents</a:t>
+            </a:r>
+            <a:endParaRPr lang="en-US" dirty="0"/>
+          </a:p>
+        </p:txBody>
+      </p:sp>
+      <p:sp>
+        <p:nvSpPr>
+          <p:cNvPr id="3" name="Content Placeholder 2"/>
+          <p:cNvSpPr>
+            <a:spLocks noGrp="1"/>
+          </p:cNvSpPr>
+          <p:nvPr>
+            <p:ph idx="1"/>
+          </p:nvPr>
+        </p:nvSpPr>
+        <p:spPr/>
+        <p:txBody>
+          <a:bodyPr/>
+          <a:lstStyle/>
+          <a:p>
+            <a:r>
+              <a:rPr lang="en-US" dirty="0" smtClean="0"/>
+              <a:t>Page 3 </a:t>
+            </a:r>
+            <a:r>
+              <a:rPr lang="en-US" dirty="0" smtClean="0">
+                <a:sym typeface="Wingdings"/>
+              </a:rPr>
+              <a:t></a:t>
+            </a:r>
+            <a:r>
+              <a:rPr lang="en-US" dirty="0" smtClean="0"/>
+              <a:t> Page 19	CRC Cards</a:t>
+            </a:r>
+          </a:p>
+          <a:p>
+            <a:r>
+              <a:rPr lang="en-US" dirty="0" smtClean="0"/>
+              <a:t>Page 20			System Interaction and Environment</a:t>
+            </a:r>
+          </a:p>
+          <a:p>
+            <a:r>
+              <a:rPr lang="en-US" dirty="0" smtClean="0"/>
+              <a:t>Page 21			System Architecture</a:t>
+            </a:r>
+          </a:p>
+          <a:p>
+            <a:r>
+              <a:rPr lang="en-US" dirty="0" smtClean="0"/>
+              <a:t>Page 22 </a:t>
+            </a:r>
+            <a:r>
+              <a:rPr lang="en-US" dirty="0" smtClean="0">
+                <a:sym typeface="Wingdings"/>
+              </a:rPr>
+              <a:t> Page 24	System Decomposition</a:t>
+            </a:r>
+            <a:endParaRPr lang="en-US" dirty="0"/>
+          </a:p>
+        </p:txBody>
+      </p:sp>
+    </p:spTree>
+    <p:extLst>
+      <p:ext uri="{BB962C8B-B14F-4D97-AF65-F5344CB8AC3E}">
+        <p14:creationId xmlns:p14="http://schemas.microsoft.com/office/powerpoint/2010/main" val="1428566902"/>
+      </p:ext>
+    </p:extLst>
+  </p:cSld>
+  <p:clrMapOvr>
+    <a:masterClrMapping/>
+  </p:clrMapOvr>
+</p:sld>
+</file>
+
+<file path=ppt/slides/slide20.xml><?xml version="1.0" encoding="utf-8"?>
 <p:sld xmlns:a="http://schemas.openxmlformats.org/drawingml/2006/main" xmlns:r="http://schemas.openxmlformats.org/officeDocument/2006/relationships" xmlns:p="http://schemas.openxmlformats.org/presentationml/2006/main" showMasterSp="0">
   <p:cSld>
     <p:spTree>
@@ -4577,7 +4688,7 @@
           <a:p>
             <a:r>
               <a:rPr lang="en-US" dirty="0" smtClean="0"/>
-              <a:t>CRC Cards</a:t>
+              <a:t>System Interaction and Environment</a:t>
             </a:r>
             <a:endParaRPr lang="en-US" dirty="0"/>
           </a:p>
@@ -4600,45 +4711,48 @@
           <a:p>
             <a:r>
               <a:rPr lang="en-US" dirty="0" smtClean="0"/>
-              <a:t>-- Name: App</a:t>
+              <a:t>The technologies will be using are:</a:t>
+            </a:r>
+          </a:p>
+          <a:p>
+            <a:pPr lvl="1"/>
+            <a:r>
+              <a:rPr lang="en-US" dirty="0" smtClean="0"/>
+              <a:t>Server: </a:t>
+            </a:r>
+            <a:r>
+              <a:rPr lang="en-US" dirty="0" err="1" smtClean="0"/>
+              <a:t>Node.js</a:t>
+            </a:r>
+            <a:r>
+              <a:rPr lang="en-US" dirty="0" smtClean="0"/>
+              <a:t>, Express framework</a:t>
+            </a:r>
+          </a:p>
+          <a:p>
+            <a:pPr lvl="1"/>
+            <a:r>
+              <a:rPr lang="en-US" dirty="0" smtClean="0"/>
+              <a:t>Database: </a:t>
+            </a:r>
+            <a:r>
+              <a:rPr lang="en-US" dirty="0" err="1" smtClean="0"/>
+              <a:t>Nedb</a:t>
+            </a:r>
+            <a:endParaRPr lang="en-US" dirty="0" smtClean="0"/>
+          </a:p>
+          <a:p>
+            <a:pPr lvl="1"/>
+            <a:r>
+              <a:rPr lang="en-US" dirty="0" smtClean="0"/>
+              <a:t>Front-end: HTML5, CSS, plaint JavaScript</a:t>
             </a:r>
             <a:endParaRPr lang="en-US" dirty="0"/>
           </a:p>
           <a:p>
             <a:r>
               <a:rPr lang="en-US" dirty="0" smtClean="0"/>
-              <a:t>-- Responsibilities: </a:t>
-            </a:r>
-          </a:p>
-          <a:p>
-            <a:pPr lvl="1"/>
-            <a:r>
-              <a:rPr lang="en-US" dirty="0" smtClean="0"/>
-              <a:t>-- Register a new user/admin, recording the basic account info in the database</a:t>
-            </a:r>
-          </a:p>
-          <a:p>
-            <a:pPr lvl="1"/>
-            <a:r>
-              <a:rPr lang="en-US" dirty="0" smtClean="0"/>
-              <a:t>-- Create a new post/mail/profile and record its info in the database</a:t>
-            </a:r>
-          </a:p>
-          <a:p>
-            <a:pPr lvl="1"/>
-            <a:r>
-              <a:rPr lang="en-US" dirty="0" smtClean="0"/>
-              <a:t>-- Construct the server</a:t>
-            </a:r>
-          </a:p>
-          <a:p>
-            <a:pPr lvl="1"/>
-            <a:endParaRPr lang="en-US" dirty="0" smtClean="0"/>
-          </a:p>
-          <a:p>
-            <a:r>
-              <a:rPr lang="en-US" dirty="0" smtClean="0"/>
-              <a:t>-- Collaborators: None</a:t>
+              <a:t>The users will be able to use our application through a PC on a modernly widely used browser(e.g. Safari, Chrome)</a:t>
             </a:r>
           </a:p>
         </p:txBody>
@@ -4646,147 +4760,7 @@
     </p:spTree>
     <p:extLst>
       <p:ext uri="{BB962C8B-B14F-4D97-AF65-F5344CB8AC3E}">
-        <p14:creationId xmlns:p14="http://schemas.microsoft.com/office/powerpoint/2010/main" val="1823453976"/>
-      </p:ext>
-    </p:extLst>
-  </p:cSld>
-  <p:clrMapOvr>
-    <a:masterClrMapping/>
-  </p:clrMapOvr>
-</p:sld>
-</file>
-
-<file path=ppt/slides/slide20.xml><?xml version="1.0" encoding="utf-8"?>
-<p:sld xmlns:a="http://schemas.openxmlformats.org/drawingml/2006/main" xmlns:r="http://schemas.openxmlformats.org/officeDocument/2006/relationships" xmlns:p="http://schemas.openxmlformats.org/presentationml/2006/main">
-  <p:cSld>
-    <p:spTree>
-      <p:nvGrpSpPr>
-        <p:cNvPr id="1" name=""/>
-        <p:cNvGrpSpPr/>
-        <p:nvPr/>
-      </p:nvGrpSpPr>
-      <p:grpSpPr>
-        <a:xfrm>
-          <a:off x="0" y="0"/>
-          <a:ext cx="0" cy="0"/>
-          <a:chOff x="0" y="0"/>
-          <a:chExt cx="0" cy="0"/>
-        </a:xfrm>
-      </p:grpSpPr>
-      <p:sp>
-        <p:nvSpPr>
-          <p:cNvPr id="2" name="Title 1"/>
-          <p:cNvSpPr>
-            <a:spLocks noGrp="1"/>
-          </p:cNvSpPr>
-          <p:nvPr>
-            <p:ph type="title"/>
-          </p:nvPr>
-        </p:nvSpPr>
-        <p:spPr/>
-        <p:txBody>
-          <a:bodyPr/>
-          <a:lstStyle/>
-          <a:p>
-            <a:r>
-              <a:rPr lang="en-US" dirty="0" smtClean="0"/>
-              <a:t>System Architecture</a:t>
-            </a:r>
-            <a:endParaRPr lang="en-US" dirty="0"/>
-          </a:p>
-        </p:txBody>
-      </p:sp>
-      <p:pic>
-        <p:nvPicPr>
-          <p:cNvPr id="4" name="Content Placeholder 3"/>
-          <p:cNvPicPr>
-            <a:picLocks noGrp="1" noChangeAspect="1"/>
-          </p:cNvPicPr>
-          <p:nvPr>
-            <p:ph idx="1"/>
-          </p:nvPr>
-        </p:nvPicPr>
-        <p:blipFill>
-          <a:blip r:embed="rId2">
-            <a:extLst>
-              <a:ext uri="{28A0092B-C50C-407E-A947-70E740481C1C}">
-                <a14:useLocalDpi xmlns:a14="http://schemas.microsoft.com/office/drawing/2010/main" val="0"/>
-              </a:ext>
-            </a:extLst>
-          </a:blip>
-          <a:stretch>
-            <a:fillRect/>
-          </a:stretch>
-        </p:blipFill>
-        <p:spPr>
-          <a:xfrm>
-            <a:off x="838200" y="1690688"/>
-            <a:ext cx="5502837" cy="4351338"/>
-          </a:xfrm>
-        </p:spPr>
-      </p:pic>
-      <p:sp>
-        <p:nvSpPr>
-          <p:cNvPr id="5" name="TextBox 4"/>
-          <p:cNvSpPr txBox="1"/>
-          <p:nvPr/>
-        </p:nvSpPr>
-        <p:spPr>
-          <a:xfrm>
-            <a:off x="6853238" y="1690688"/>
-            <a:ext cx="4500562" cy="1477328"/>
-          </a:xfrm>
-          <a:prstGeom prst="rect">
-            <a:avLst/>
-          </a:prstGeom>
-          <a:noFill/>
-        </p:spPr>
-        <p:txBody>
-          <a:bodyPr wrap="square" rtlCol="0">
-            <a:spAutoFit/>
-          </a:bodyPr>
-          <a:lstStyle/>
-          <a:p>
-            <a:r>
-              <a:rPr lang="en-US" b="1" dirty="0" smtClean="0"/>
-              <a:t>Data transmission:</a:t>
-            </a:r>
-          </a:p>
-          <a:p>
-            <a:endParaRPr lang="en-US" b="1" dirty="0"/>
-          </a:p>
-          <a:p>
-            <a:r>
-              <a:rPr lang="en-US" b="1" dirty="0" smtClean="0"/>
-              <a:t>Between Client and Server: AJAX requests and </a:t>
-            </a:r>
-            <a:r>
-              <a:rPr lang="en-US" b="1" dirty="0" err="1" smtClean="0"/>
-              <a:t>json</a:t>
-            </a:r>
-            <a:r>
-              <a:rPr lang="en-US" b="1" dirty="0" smtClean="0"/>
-              <a:t> responses</a:t>
-            </a:r>
-            <a:endParaRPr lang="en-US" b="1" dirty="0"/>
-          </a:p>
-          <a:p>
-            <a:r>
-              <a:rPr lang="en-US" b="1" dirty="0" smtClean="0"/>
-              <a:t>Between Server and database: </a:t>
-            </a:r>
-            <a:r>
-              <a:rPr lang="en-US" b="1" dirty="0" err="1" smtClean="0"/>
-              <a:t>json</a:t>
-            </a:r>
-            <a:endParaRPr lang="en-US" b="1" dirty="0"/>
-          </a:p>
-        </p:txBody>
-      </p:sp>
-    </p:spTree>
-    <p:extLst>
-      <p:ext uri="{BB962C8B-B14F-4D97-AF65-F5344CB8AC3E}">
-        <p14:creationId xmlns:p14="http://schemas.microsoft.com/office/powerpoint/2010/main" val="386764356"/>
+        <p14:creationId xmlns:p14="http://schemas.microsoft.com/office/powerpoint/2010/main" val="1922570035"/>
       </p:ext>
     </p:extLst>
   </p:cSld>
@@ -4830,65 +4804,103 @@
           <a:p>
             <a:r>
               <a:rPr lang="en-US" dirty="0" smtClean="0"/>
-              <a:t>System Decomposition </a:t>
-            </a:r>
-            <a:r>
-              <a:rPr lang="mr-IN" dirty="0" smtClean="0"/>
-              <a:t>–</a:t>
-            </a:r>
-            <a:r>
-              <a:rPr lang="en-US" dirty="0" smtClean="0"/>
-              <a:t> design pattern</a:t>
+              <a:t>System Architecture</a:t>
             </a:r>
             <a:endParaRPr lang="en-US" dirty="0"/>
           </a:p>
         </p:txBody>
       </p:sp>
-      <p:sp>
-        <p:nvSpPr>
-          <p:cNvPr id="3" name="Content Placeholder 2"/>
-          <p:cNvSpPr>
-            <a:spLocks noGrp="1"/>
-          </p:cNvSpPr>
+      <p:pic>
+        <p:nvPicPr>
+          <p:cNvPr id="4" name="Content Placeholder 3"/>
+          <p:cNvPicPr>
+            <a:picLocks noGrp="1" noChangeAspect="1"/>
+          </p:cNvPicPr>
           <p:nvPr>
             <p:ph idx="1"/>
           </p:nvPr>
-        </p:nvSpPr>
-        <p:spPr/>
-        <p:txBody>
-          <a:bodyPr/>
-          <a:lstStyle/>
-          <a:p>
-            <a:r>
-              <a:rPr lang="en-US" dirty="0" smtClean="0"/>
-              <a:t>The design pattern is MVC</a:t>
-            </a:r>
-          </a:p>
-          <a:p>
-            <a:r>
-              <a:rPr lang="en-US" dirty="0" smtClean="0"/>
-              <a:t>View: The views are described in html text</a:t>
-            </a:r>
-          </a:p>
-          <a:p>
-            <a:r>
-              <a:rPr lang="en-US" dirty="0" smtClean="0"/>
-              <a:t>Model: The model contains the database, API and all object definitions(user, post etc.)</a:t>
-            </a:r>
-          </a:p>
-          <a:p>
-            <a:r>
-              <a:rPr lang="en-US" dirty="0" smtClean="0"/>
-              <a:t>Controller: The controller provides a layer setting between views and the model. Specifically, the controller defines how information are derived from front-end html(buttons, forms etc.), how information are retrieved from the database and what calculations are done between the client-server interaction to make successful communication</a:t>
-            </a:r>
-            <a:endParaRPr lang="en-US" dirty="0"/>
+        </p:nvPicPr>
+        <p:blipFill>
+          <a:blip r:embed="rId2">
+            <a:extLst>
+              <a:ext uri="{28A0092B-C50C-407E-A947-70E740481C1C}">
+                <a14:useLocalDpi xmlns:a14="http://schemas.microsoft.com/office/drawing/2010/main" val="0"/>
+              </a:ext>
+            </a:extLst>
+          </a:blip>
+          <a:stretch>
+            <a:fillRect/>
+          </a:stretch>
+        </p:blipFill>
+        <p:spPr>
+          <a:xfrm>
+            <a:off x="838200" y="1690688"/>
+            <a:ext cx="5502837" cy="4351338"/>
+          </a:xfrm>
+        </p:spPr>
+      </p:pic>
+      <p:sp>
+        <p:nvSpPr>
+          <p:cNvPr id="5" name="TextBox 4"/>
+          <p:cNvSpPr txBox="1"/>
+          <p:nvPr/>
+        </p:nvSpPr>
+        <p:spPr>
+          <a:xfrm>
+            <a:off x="6853238" y="1690688"/>
+            <a:ext cx="4500562" cy="1477328"/>
+          </a:xfrm>
+          <a:prstGeom prst="rect">
+            <a:avLst/>
+          </a:prstGeom>
+          <a:noFill/>
+        </p:spPr>
+        <p:txBody>
+          <a:bodyPr wrap="square" rtlCol="0">
+            <a:spAutoFit/>
+          </a:bodyPr>
+          <a:lstStyle/>
+          <a:p>
+            <a:r>
+              <a:rPr lang="en-US" b="1" dirty="0" smtClean="0"/>
+              <a:t>Data transmission:</a:t>
+            </a:r>
+          </a:p>
+          <a:p>
+            <a:endParaRPr lang="en-US" b="1" dirty="0"/>
+          </a:p>
+          <a:p>
+            <a:r>
+              <a:rPr lang="en-US" b="1" dirty="0" smtClean="0"/>
+              <a:t>Between Client and Server: AJAX requests and </a:t>
+            </a:r>
+            <a:r>
+              <a:rPr lang="en-US" b="1" dirty="0" err="1" smtClean="0"/>
+              <a:t>json</a:t>
+            </a:r>
+            <a:r>
+              <a:rPr lang="en-US" b="1" dirty="0" smtClean="0"/>
+              <a:t> responses</a:t>
+            </a:r>
+            <a:endParaRPr lang="en-US" b="1" dirty="0"/>
+          </a:p>
+          <a:p>
+            <a:r>
+              <a:rPr lang="en-US" b="1" dirty="0" smtClean="0"/>
+              <a:t>Between Server and database: </a:t>
+            </a:r>
+            <a:r>
+              <a:rPr lang="en-US" b="1" dirty="0" err="1" smtClean="0"/>
+              <a:t>json</a:t>
+            </a:r>
+            <a:endParaRPr lang="en-US" b="1" dirty="0"/>
           </a:p>
         </p:txBody>
       </p:sp>
     </p:spTree>
     <p:extLst>
       <p:ext uri="{BB962C8B-B14F-4D97-AF65-F5344CB8AC3E}">
-        <p14:creationId xmlns:p14="http://schemas.microsoft.com/office/powerpoint/2010/main" val="406021721"/>
+        <p14:creationId xmlns:p14="http://schemas.microsoft.com/office/powerpoint/2010/main" val="386764356"/>
       </p:ext>
     </p:extLst>
   </p:cSld>
@@ -4940,6 +4952,108 @@
             </a:r>
             <a:r>
               <a:rPr lang="en-US" dirty="0" smtClean="0"/>
+              <a:t> design pattern</a:t>
+            </a:r>
+            <a:endParaRPr lang="en-US" dirty="0"/>
+          </a:p>
+        </p:txBody>
+      </p:sp>
+      <p:sp>
+        <p:nvSpPr>
+          <p:cNvPr id="3" name="Content Placeholder 2"/>
+          <p:cNvSpPr>
+            <a:spLocks noGrp="1"/>
+          </p:cNvSpPr>
+          <p:nvPr>
+            <p:ph idx="1"/>
+          </p:nvPr>
+        </p:nvSpPr>
+        <p:spPr/>
+        <p:txBody>
+          <a:bodyPr/>
+          <a:lstStyle/>
+          <a:p>
+            <a:r>
+              <a:rPr lang="en-US" dirty="0" smtClean="0"/>
+              <a:t>The design pattern is MVC</a:t>
+            </a:r>
+          </a:p>
+          <a:p>
+            <a:r>
+              <a:rPr lang="en-US" dirty="0" smtClean="0"/>
+              <a:t>View: The views are described in html text</a:t>
+            </a:r>
+          </a:p>
+          <a:p>
+            <a:r>
+              <a:rPr lang="en-US" dirty="0" smtClean="0"/>
+              <a:t>Model: The model contains the database, API and all object definitions(user, post etc.)</a:t>
+            </a:r>
+          </a:p>
+          <a:p>
+            <a:r>
+              <a:rPr lang="en-US" dirty="0" smtClean="0"/>
+              <a:t>Controller: The controller provides a layer setting between views and the model. Specifically, the controller defines how information are derived from front-end html(buttons, forms etc.), how information are retrieved from the database and what calculations are done between the client-server interaction to make successful communication</a:t>
+            </a:r>
+            <a:endParaRPr lang="en-US" dirty="0"/>
+          </a:p>
+        </p:txBody>
+      </p:sp>
+    </p:spTree>
+    <p:extLst>
+      <p:ext uri="{BB962C8B-B14F-4D97-AF65-F5344CB8AC3E}">
+        <p14:creationId xmlns:p14="http://schemas.microsoft.com/office/powerpoint/2010/main" val="406021721"/>
+      </p:ext>
+    </p:extLst>
+  </p:cSld>
+  <p:clrMapOvr>
+    <a:masterClrMapping/>
+  </p:clrMapOvr>
+</p:sld>
+</file>
+
+<file path=ppt/slides/slide23.xml><?xml version="1.0" encoding="utf-8"?>
+<p:sld xmlns:a="http://schemas.openxmlformats.org/drawingml/2006/main" xmlns:r="http://schemas.openxmlformats.org/officeDocument/2006/relationships" xmlns:p="http://schemas.openxmlformats.org/presentationml/2006/main">
+  <p:cSld>
+    <p:spTree>
+      <p:nvGrpSpPr>
+        <p:cNvPr id="1" name=""/>
+        <p:cNvGrpSpPr/>
+        <p:nvPr/>
+      </p:nvGrpSpPr>
+      <p:grpSpPr>
+        <a:xfrm>
+          <a:off x="0" y="0"/>
+          <a:ext cx="0" cy="0"/>
+          <a:chOff x="0" y="0"/>
+          <a:chExt cx="0" cy="0"/>
+        </a:xfrm>
+      </p:grpSpPr>
+      <p:sp>
+        <p:nvSpPr>
+          <p:cNvPr id="2" name="Title 1"/>
+          <p:cNvSpPr>
+            <a:spLocks noGrp="1"/>
+          </p:cNvSpPr>
+          <p:nvPr>
+            <p:ph type="title"/>
+          </p:nvPr>
+        </p:nvSpPr>
+        <p:spPr/>
+        <p:txBody>
+          <a:bodyPr/>
+          <a:lstStyle/>
+          <a:p>
+            <a:r>
+              <a:rPr lang="en-US" dirty="0" smtClean="0"/>
+              <a:t>System Decomposition </a:t>
+            </a:r>
+            <a:r>
+              <a:rPr lang="mr-IN" dirty="0" smtClean="0"/>
+              <a:t>–</a:t>
+            </a:r>
+            <a:r>
+              <a:rPr lang="en-US" dirty="0" smtClean="0"/>
               <a:t> job of classes</a:t>
             </a:r>
             <a:endParaRPr lang="en-US" dirty="0"/>
@@ -5002,7 +5116,7 @@
 </p:sld>
 </file>
 
-<file path=ppt/slides/slide23.xml><?xml version="1.0" encoding="utf-8"?>
+<file path=ppt/slides/slide24.xml><?xml version="1.0" encoding="utf-8"?>
 <p:sld xmlns:a="http://schemas.openxmlformats.org/drawingml/2006/main" xmlns:r="http://schemas.openxmlformats.org/officeDocument/2006/relationships" xmlns:p="http://schemas.openxmlformats.org/presentationml/2006/main">
   <p:cSld>
     <p:spTree>
@@ -5201,11 +5315,7 @@
           <a:p>
             <a:r>
               <a:rPr lang="en-US" dirty="0" smtClean="0"/>
-              <a:t>-- Name: </a:t>
-            </a:r>
-            <a:r>
-              <a:rPr lang="en-US" dirty="0" err="1" smtClean="0"/>
-              <a:t>UINavigator</a:t>
+              <a:t>-- Name: App</a:t>
             </a:r>
             <a:endParaRPr lang="en-US" dirty="0"/>
           </a:p>
@@ -5219,19 +5329,21 @@
             <a:pPr lvl="1"/>
             <a:r>
               <a:rPr lang="en-US" dirty="0" smtClean="0"/>
-              <a:t>-- Define the functions/responsibilities of all front-end </a:t>
-            </a:r>
-            <a:r>
-              <a:rPr lang="en-US" dirty="0" err="1" smtClean="0"/>
-              <a:t>buttons&amp;forms</a:t>
-            </a:r>
-            <a:r>
-              <a:rPr lang="en-US" dirty="0"/>
-              <a:t> </a:t>
-            </a:r>
-            <a:r>
-              <a:rPr lang="en-US" dirty="0" smtClean="0"/>
-              <a:t>interacting with the back-end database  </a:t>
+              <a:t>-- Register a new user/admin, recording the basic account info in the database</a:t>
+            </a:r>
+          </a:p>
+          <a:p>
+            <a:pPr lvl="1"/>
+            <a:r>
+              <a:rPr lang="en-US" dirty="0" smtClean="0"/>
+              <a:t>-- Create a new post/mail/profile and record its info in the database</a:t>
+            </a:r>
+          </a:p>
+          <a:p>
+            <a:pPr lvl="1"/>
+            <a:r>
+              <a:rPr lang="en-US" dirty="0" smtClean="0"/>
+              <a:t>-- Construct the server</a:t>
             </a:r>
           </a:p>
           <a:p>
@@ -5249,7 +5361,7 @@
     </p:spTree>
     <p:extLst>
       <p:ext uri="{BB962C8B-B14F-4D97-AF65-F5344CB8AC3E}">
-        <p14:creationId xmlns:p14="http://schemas.microsoft.com/office/powerpoint/2010/main" val="641199464"/>
+        <p14:creationId xmlns:p14="http://schemas.microsoft.com/office/powerpoint/2010/main" val="1823453976"/>
       </p:ext>
     </p:extLst>
   </p:cSld>
@@ -5311,13 +5423,18 @@
         </p:nvSpPr>
         <p:spPr/>
         <p:txBody>
-          <a:bodyPr numCol="1"/>
-          <a:lstStyle/>
-          <a:p>
-            <a:r>
-              <a:rPr lang="en-US" dirty="0" smtClean="0"/>
-              <a:t>-- Name: User</a:t>
-            </a:r>
+          <a:bodyPr/>
+          <a:lstStyle/>
+          <a:p>
+            <a:r>
+              <a:rPr lang="en-US" dirty="0" smtClean="0"/>
+              <a:t>-- Name: </a:t>
+            </a:r>
+            <a:r>
+              <a:rPr lang="en-US" dirty="0" err="1" smtClean="0"/>
+              <a:t>UINavigator</a:t>
+            </a:r>
+            <a:endParaRPr lang="en-US" dirty="0"/>
           </a:p>
           <a:p>
             <a:r>
@@ -5329,42 +5446,29 @@
             <a:pPr lvl="1"/>
             <a:r>
               <a:rPr lang="en-US" dirty="0" smtClean="0"/>
-              <a:t>-- Knows its username and password</a:t>
+              <a:t>-- Define the functions/responsibilities of all front-end </a:t>
+            </a:r>
+            <a:r>
+              <a:rPr lang="en-US" dirty="0" err="1" smtClean="0"/>
+              <a:t>buttons&amp;forms</a:t>
+            </a:r>
+            <a:r>
+              <a:rPr lang="en-US" dirty="0"/>
+              <a:t> </a:t>
+            </a:r>
+            <a:r>
+              <a:rPr lang="en-US" dirty="0" smtClean="0"/>
+              <a:t>interacting with the back-end database  </a:t>
             </a:r>
           </a:p>
           <a:p>
             <a:pPr lvl="1"/>
-            <a:r>
-              <a:rPr lang="en-US" dirty="0" smtClean="0"/>
-              <a:t>-- Can update/delete the user’s basic info</a:t>
-            </a:r>
-          </a:p>
-          <a:p>
-            <a:pPr lvl="1"/>
-            <a:r>
-              <a:rPr lang="en-US" dirty="0" smtClean="0"/>
-              <a:t>-- Can create/delete/update its posts and edit its profile</a:t>
-            </a:r>
-          </a:p>
-          <a:p>
-            <a:pPr lvl="1"/>
-            <a:r>
-              <a:rPr lang="en-US" dirty="0" smtClean="0"/>
-              <a:t>-- Can send/receive email</a:t>
-            </a:r>
-          </a:p>
-          <a:p>
-            <a:r>
-              <a:rPr lang="en-US" dirty="0" smtClean="0"/>
-              <a:t>-- Collaborators: </a:t>
-            </a:r>
-            <a:r>
-              <a:rPr lang="en-US" dirty="0" err="1" smtClean="0"/>
-              <a:t>UserDAOImple</a:t>
-            </a:r>
-            <a:r>
-              <a:rPr lang="en-US" dirty="0" smtClean="0"/>
-              <a:t>, Post, Profile, Mail, App</a:t>
+            <a:endParaRPr lang="en-US" dirty="0" smtClean="0"/>
+          </a:p>
+          <a:p>
+            <a:r>
+              <a:rPr lang="en-US" dirty="0" smtClean="0"/>
+              <a:t>-- Collaborators: None</a:t>
             </a:r>
           </a:p>
         </p:txBody>
@@ -5372,7 +5476,7 @@
     </p:spTree>
     <p:extLst>
       <p:ext uri="{BB962C8B-B14F-4D97-AF65-F5344CB8AC3E}">
-        <p14:creationId xmlns:p14="http://schemas.microsoft.com/office/powerpoint/2010/main" val="1467051318"/>
+        <p14:creationId xmlns:p14="http://schemas.microsoft.com/office/powerpoint/2010/main" val="641199464"/>
       </p:ext>
     </p:extLst>
   </p:cSld>
@@ -5434,12 +5538,12 @@
         </p:nvSpPr>
         <p:spPr/>
         <p:txBody>
-          <a:bodyPr/>
-          <a:lstStyle/>
-          <a:p>
-            <a:r>
-              <a:rPr lang="en-US" dirty="0" smtClean="0"/>
-              <a:t>-- Name: Post</a:t>
+          <a:bodyPr numCol="1"/>
+          <a:lstStyle/>
+          <a:p>
+            <a:r>
+              <a:rPr lang="en-US" dirty="0" smtClean="0"/>
+              <a:t>-- Name: User</a:t>
             </a:r>
           </a:p>
           <a:p>
@@ -5452,48 +5556,50 @@
             <a:pPr lvl="1"/>
             <a:r>
               <a:rPr lang="en-US" dirty="0" smtClean="0"/>
-              <a:t>-- Knows who makes the post</a:t>
+              <a:t>-- Knows its username and password</a:t>
             </a:r>
           </a:p>
           <a:p>
             <a:pPr lvl="1"/>
             <a:r>
               <a:rPr lang="en-US" dirty="0" smtClean="0"/>
-              <a:t>-- Knows the basic info(id, </a:t>
+              <a:t>-- Can update/delete the user’s basic info</a:t>
+            </a:r>
+          </a:p>
+          <a:p>
+            <a:pPr lvl="1"/>
+            <a:r>
+              <a:rPr lang="en-US" dirty="0" smtClean="0"/>
+              <a:t>-- Can create/delete/update its posts and edit its profile</a:t>
+            </a:r>
+          </a:p>
+          <a:p>
+            <a:pPr lvl="1"/>
+            <a:r>
+              <a:rPr lang="en-US" dirty="0" smtClean="0"/>
+              <a:t>-- Can send/receive email</a:t>
+            </a:r>
+          </a:p>
+          <a:p>
+            <a:r>
+              <a:rPr lang="en-US" dirty="0" smtClean="0"/>
+              <a:t>-- Collaborators: </a:t>
             </a:r>
             <a:r>
               <a:rPr lang="en-US" dirty="0" err="1" smtClean="0"/>
-              <a:t>date&amp;time</a:t>
-            </a:r>
-            <a:r>
-              <a:rPr lang="en-US" dirty="0" smtClean="0"/>
-              <a:t>, content) of the post</a:t>
-            </a:r>
-          </a:p>
-          <a:p>
-            <a:pPr lvl="1"/>
-            <a:r>
-              <a:rPr lang="en-US" dirty="0" smtClean="0"/>
-              <a:t>-- Can update/delete this post’s info</a:t>
-            </a:r>
-          </a:p>
-          <a:p>
-            <a:r>
-              <a:rPr lang="en-US" dirty="0" smtClean="0"/>
-              <a:t>-- Collaborators: </a:t>
-            </a:r>
-            <a:r>
-              <a:rPr lang="en-US" dirty="0" err="1" smtClean="0"/>
-              <a:t>PostDAOImple</a:t>
-            </a:r>
-            <a:endParaRPr lang="en-US" dirty="0" smtClean="0"/>
+              <a:t>UserDAOImple</a:t>
+            </a:r>
+            <a:r>
+              <a:rPr lang="en-US" dirty="0" smtClean="0"/>
+              <a:t>, Post, Profile, Mail, App</a:t>
+            </a:r>
           </a:p>
         </p:txBody>
       </p:sp>
     </p:spTree>
     <p:extLst>
       <p:ext uri="{BB962C8B-B14F-4D97-AF65-F5344CB8AC3E}">
-        <p14:creationId xmlns:p14="http://schemas.microsoft.com/office/powerpoint/2010/main" val="509461404"/>
+        <p14:creationId xmlns:p14="http://schemas.microsoft.com/office/powerpoint/2010/main" val="1467051318"/>
       </p:ext>
     </p:extLst>
   </p:cSld>
@@ -5560,7 +5666,7 @@
           <a:p>
             <a:r>
               <a:rPr lang="en-US" dirty="0" smtClean="0"/>
-              <a:t>-- Name: Mail</a:t>
+              <a:t>-- Name: Post</a:t>
             </a:r>
           </a:p>
           <a:p>
@@ -5573,7 +5679,7 @@
             <a:pPr lvl="1"/>
             <a:r>
               <a:rPr lang="en-US" dirty="0" smtClean="0"/>
-              <a:t>-- Knows the sender and receiver</a:t>
+              <a:t>-- Knows who makes the post</a:t>
             </a:r>
           </a:p>
           <a:p>
@@ -5588,14 +5694,14 @@
             </a:r>
             <a:r>
               <a:rPr lang="en-US" dirty="0" smtClean="0"/>
-              <a:t>, content) of the email</a:t>
+              <a:t>, content) of the post</a:t>
             </a:r>
           </a:p>
           <a:p>
             <a:pPr lvl="1"/>
             <a:r>
               <a:rPr lang="en-US" dirty="0" smtClean="0"/>
-              <a:t>-- Can update/delete this mail’s info</a:t>
+              <a:t>-- Can update/delete this post’s info</a:t>
             </a:r>
           </a:p>
           <a:p>
@@ -5605,7 +5711,7 @@
             </a:r>
             <a:r>
               <a:rPr lang="en-US" dirty="0" err="1" smtClean="0"/>
-              <a:t>MailDAOImple</a:t>
+              <a:t>PostDAOImple</a:t>
             </a:r>
             <a:endParaRPr lang="en-US" dirty="0" smtClean="0"/>
           </a:p>
@@ -5614,7 +5720,7 @@
     </p:spTree>
     <p:extLst>
       <p:ext uri="{BB962C8B-B14F-4D97-AF65-F5344CB8AC3E}">
-        <p14:creationId xmlns:p14="http://schemas.microsoft.com/office/powerpoint/2010/main" val="1846506430"/>
+        <p14:creationId xmlns:p14="http://schemas.microsoft.com/office/powerpoint/2010/main" val="509461404"/>
       </p:ext>
     </p:extLst>
   </p:cSld>
@@ -5681,9 +5787,8 @@
           <a:p>
             <a:r>
               <a:rPr lang="en-US" dirty="0" smtClean="0"/>
-              <a:t>-- Name: Profile</a:t>
-            </a:r>
-            <a:endParaRPr lang="en-US" dirty="0"/>
+              <a:t>-- Name: Mail</a:t>
+            </a:r>
           </a:p>
           <a:p>
             <a:r>
@@ -5695,21 +5800,29 @@
             <a:pPr lvl="1"/>
             <a:r>
               <a:rPr lang="en-US" dirty="0" smtClean="0"/>
-              <a:t>-- Knows who owns this profile</a:t>
+              <a:t>-- Knows the sender and receiver</a:t>
             </a:r>
           </a:p>
           <a:p>
             <a:pPr lvl="1"/>
             <a:r>
               <a:rPr lang="en-US" dirty="0" smtClean="0"/>
-              <a:t>-- Knows its basic info(contact info, preferences)</a:t>
+              <a:t>-- Knows the basic info(id, </a:t>
+            </a:r>
+            <a:r>
+              <a:rPr lang="en-US" dirty="0" err="1" smtClean="0"/>
+              <a:t>date&amp;time</a:t>
+            </a:r>
+            <a:r>
+              <a:rPr lang="en-US" dirty="0" smtClean="0"/>
+              <a:t>, content) of the email</a:t>
             </a:r>
           </a:p>
           <a:p>
             <a:pPr lvl="1"/>
             <a:r>
               <a:rPr lang="en-US" dirty="0" smtClean="0"/>
-              <a:t>-- Can update/delete this profile</a:t>
+              <a:t>-- Can update/delete this mail’s info</a:t>
             </a:r>
           </a:p>
           <a:p>
@@ -5719,7 +5832,7 @@
             </a:r>
             <a:r>
               <a:rPr lang="en-US" dirty="0" err="1" smtClean="0"/>
-              <a:t>ProfileDAOImple</a:t>
+              <a:t>MailDAOImple</a:t>
             </a:r>
             <a:endParaRPr lang="en-US" dirty="0" smtClean="0"/>
           </a:p>
@@ -5728,7 +5841,7 @@
     </p:spTree>
     <p:extLst>
       <p:ext uri="{BB962C8B-B14F-4D97-AF65-F5344CB8AC3E}">
-        <p14:creationId xmlns:p14="http://schemas.microsoft.com/office/powerpoint/2010/main" val="1532585428"/>
+        <p14:creationId xmlns:p14="http://schemas.microsoft.com/office/powerpoint/2010/main" val="1846506430"/>
       </p:ext>
     </p:extLst>
   </p:cSld>
@@ -5795,8 +5908,9 @@
           <a:p>
             <a:r>
               <a:rPr lang="en-US" dirty="0" smtClean="0"/>
-              <a:t>-- Name: Administrator</a:t>
-            </a:r>
+              <a:t>-- Name: Profile</a:t>
+            </a:r>
+            <a:endParaRPr lang="en-US" dirty="0"/>
           </a:p>
           <a:p>
             <a:r>
@@ -5808,61 +5922,40 @@
             <a:pPr lvl="1"/>
             <a:r>
               <a:rPr lang="en-US" dirty="0" smtClean="0"/>
-              <a:t>-- Knows its username and password</a:t>
+              <a:t>-- Knows who owns this profile</a:t>
             </a:r>
           </a:p>
           <a:p>
             <a:pPr lvl="1"/>
             <a:r>
               <a:rPr lang="en-US" dirty="0" smtClean="0"/>
-              <a:t>-- Can update/delete any user’s basic info</a:t>
+              <a:t>-- Knows its basic info(contact info, preferences)</a:t>
             </a:r>
           </a:p>
           <a:p>
             <a:pPr lvl="1"/>
             <a:r>
               <a:rPr lang="en-US" dirty="0" smtClean="0"/>
-              <a:t>-- Can create/delete/update any posts and edit any profile</a:t>
-            </a:r>
-          </a:p>
-          <a:p>
-            <a:pPr lvl="1"/>
-            <a:r>
-              <a:rPr lang="en-US" dirty="0" smtClean="0"/>
-              <a:t>-- Can send/receive email</a:t>
-            </a:r>
-          </a:p>
-          <a:p>
-            <a:pPr lvl="1"/>
-            <a:r>
-              <a:rPr lang="en-US" dirty="0" smtClean="0"/>
-              <a:t>-- Can delete/update any email</a:t>
-            </a:r>
-          </a:p>
-          <a:p>
-            <a:pPr lvl="1"/>
+              <a:t>-- Can update/delete this profile</a:t>
+            </a:r>
+          </a:p>
+          <a:p>
+            <a:r>
+              <a:rPr lang="en-US" dirty="0" smtClean="0"/>
+              <a:t>-- Collaborators: </a:t>
+            </a:r>
+            <a:r>
+              <a:rPr lang="en-US" dirty="0" err="1" smtClean="0"/>
+              <a:t>ProfileDAOImple</a:t>
+            </a:r>
             <a:endParaRPr lang="en-US" dirty="0" smtClean="0"/>
-          </a:p>
-          <a:p>
-            <a:r>
-              <a:rPr lang="en-US" dirty="0" smtClean="0"/>
-              <a:t>-- Collaborators: </a:t>
-            </a:r>
-            <a:r>
-              <a:rPr lang="en-US" dirty="0" err="1" smtClean="0"/>
-              <a:t>UserDAOImple</a:t>
-            </a:r>
-            <a:r>
-              <a:rPr lang="en-US" dirty="0" smtClean="0"/>
-              <a:t>, Post, Profile, Mail, App</a:t>
-            </a:r>
           </a:p>
         </p:txBody>
       </p:sp>
     </p:spTree>
     <p:extLst>
       <p:ext uri="{BB962C8B-B14F-4D97-AF65-F5344CB8AC3E}">
-        <p14:creationId xmlns:p14="http://schemas.microsoft.com/office/powerpoint/2010/main" val="764577768"/>
+        <p14:creationId xmlns:p14="http://schemas.microsoft.com/office/powerpoint/2010/main" val="1532585428"/>
       </p:ext>
     </p:extLst>
   </p:cSld>
@@ -5929,34 +6022,66 @@
           <a:p>
             <a:r>
               <a:rPr lang="en-US" dirty="0" smtClean="0"/>
-              <a:t>-- Name: </a:t>
+              <a:t>-- Name: Administrator</a:t>
+            </a:r>
+          </a:p>
+          <a:p>
+            <a:r>
+              <a:rPr lang="en-US" dirty="0" smtClean="0"/>
+              <a:t>-- Responsibilities: </a:t>
+            </a:r>
+          </a:p>
+          <a:p>
+            <a:pPr lvl="1"/>
+            <a:r>
+              <a:rPr lang="en-US" dirty="0" smtClean="0"/>
+              <a:t>-- Knows its username and password</a:t>
+            </a:r>
+          </a:p>
+          <a:p>
+            <a:pPr lvl="1"/>
+            <a:r>
+              <a:rPr lang="en-US" dirty="0" smtClean="0"/>
+              <a:t>-- Can update/delete any user’s basic info</a:t>
+            </a:r>
+          </a:p>
+          <a:p>
+            <a:pPr lvl="1"/>
+            <a:r>
+              <a:rPr lang="en-US" dirty="0" smtClean="0"/>
+              <a:t>-- Can create/delete/update any posts and edit any profile</a:t>
+            </a:r>
+          </a:p>
+          <a:p>
+            <a:pPr lvl="1"/>
+            <a:r>
+              <a:rPr lang="en-US" dirty="0" smtClean="0"/>
+              <a:t>-- Can send/receive email</a:t>
+            </a:r>
+          </a:p>
+          <a:p>
+            <a:pPr lvl="1"/>
+            <a:r>
+              <a:rPr lang="en-US" dirty="0" smtClean="0"/>
+              <a:t>-- Can delete/update any email</a:t>
+            </a:r>
+          </a:p>
+          <a:p>
+            <a:pPr lvl="1"/>
+            <a:endParaRPr lang="en-US" dirty="0" smtClean="0"/>
+          </a:p>
+          <a:p>
+            <a:r>
+              <a:rPr lang="en-US" dirty="0" smtClean="0"/>
+              <a:t>-- Collaborators: </a:t>
             </a:r>
             <a:r>
               <a:rPr lang="en-US" dirty="0" err="1" smtClean="0"/>
-              <a:t>UserDAO</a:t>
-            </a:r>
-            <a:r>
-              <a:rPr lang="en-US" dirty="0" smtClean="0"/>
-              <a:t> &lt;Interface&gt;</a:t>
-            </a:r>
-          </a:p>
-          <a:p>
-            <a:r>
-              <a:rPr lang="en-US" dirty="0" smtClean="0"/>
-              <a:t>-- Responsibilities: </a:t>
-            </a:r>
-          </a:p>
-          <a:p>
-            <a:pPr lvl="1"/>
-            <a:r>
-              <a:rPr lang="en-US" dirty="0" smtClean="0"/>
-              <a:t>-- Provide the abstraction of operations on the user accounts’ info in the database</a:t>
-            </a:r>
-          </a:p>
-          <a:p>
-            <a:r>
-              <a:rPr lang="en-US" dirty="0" smtClean="0"/>
-              <a:t>-- Collaborators: None</a:t>
+              <a:t>UserDAOImple</a:t>
+            </a:r>
+            <a:r>
+              <a:rPr lang="en-US" dirty="0" smtClean="0"/>
+              <a:t>, Post, Profile, Mail, App</a:t>
             </a:r>
           </a:p>
         </p:txBody>
@@ -5964,7 +6089,7 @@
     </p:spTree>
     <p:extLst>
       <p:ext uri="{BB962C8B-B14F-4D97-AF65-F5344CB8AC3E}">
-        <p14:creationId xmlns:p14="http://schemas.microsoft.com/office/powerpoint/2010/main" val="116378977"/>
+        <p14:creationId xmlns:p14="http://schemas.microsoft.com/office/powerpoint/2010/main" val="764577768"/>
       </p:ext>
     </p:extLst>
   </p:cSld>

</xml_diff>